<commit_message>
updated summer 2024 slides
</commit_message>
<xml_diff>
--- a/BiomolecularDynamicsLab2024/2024-09-summary.pptx
+++ b/BiomolecularDynamicsLab2024/2024-09-summary.pptx
@@ -192,7 +192,11 @@
               </a:defRPr>
             </a:pPr>
             <a:r>
-              <a:rPr lang="en-US" sz="2800" dirty="0"/>
+              <a:rPr lang="en-US" sz="2800" dirty="0">
+                <a:solidFill>
+                  <a:schemeClr val="tx1"/>
+                </a:solidFill>
+              </a:rPr>
               <a:t>Tm vs pH for IDJ1</a:t>
             </a:r>
           </a:p>
@@ -1392,7 +1396,7 @@
           <a:p>
             <a:fld id="{6696D9AA-86B5-49C5-B021-DCFDDFB00471}" type="datetimeFigureOut">
               <a:rPr lang="en-CA" smtClean="0"/>
-              <a:t>2024-08-29</a:t>
+              <a:t>2024-09-18</a:t>
             </a:fld>
             <a:endParaRPr lang="en-CA"/>
           </a:p>
@@ -1592,7 +1596,7 @@
           <a:p>
             <a:fld id="{6696D9AA-86B5-49C5-B021-DCFDDFB00471}" type="datetimeFigureOut">
               <a:rPr lang="en-CA" smtClean="0"/>
-              <a:t>2024-08-29</a:t>
+              <a:t>2024-09-18</a:t>
             </a:fld>
             <a:endParaRPr lang="en-CA"/>
           </a:p>
@@ -1802,7 +1806,7 @@
           <a:p>
             <a:fld id="{6696D9AA-86B5-49C5-B021-DCFDDFB00471}" type="datetimeFigureOut">
               <a:rPr lang="en-CA" smtClean="0"/>
-              <a:t>2024-08-29</a:t>
+              <a:t>2024-09-18</a:t>
             </a:fld>
             <a:endParaRPr lang="en-CA"/>
           </a:p>
@@ -2002,7 +2006,7 @@
           <a:p>
             <a:fld id="{6696D9AA-86B5-49C5-B021-DCFDDFB00471}" type="datetimeFigureOut">
               <a:rPr lang="en-CA" smtClean="0"/>
-              <a:t>2024-08-29</a:t>
+              <a:t>2024-09-18</a:t>
             </a:fld>
             <a:endParaRPr lang="en-CA"/>
           </a:p>
@@ -2278,7 +2282,7 @@
           <a:p>
             <a:fld id="{6696D9AA-86B5-49C5-B021-DCFDDFB00471}" type="datetimeFigureOut">
               <a:rPr lang="en-CA" smtClean="0"/>
-              <a:t>2024-08-29</a:t>
+              <a:t>2024-09-18</a:t>
             </a:fld>
             <a:endParaRPr lang="en-CA"/>
           </a:p>
@@ -2546,7 +2550,7 @@
           <a:p>
             <a:fld id="{6696D9AA-86B5-49C5-B021-DCFDDFB00471}" type="datetimeFigureOut">
               <a:rPr lang="en-CA" smtClean="0"/>
-              <a:t>2024-08-29</a:t>
+              <a:t>2024-09-18</a:t>
             </a:fld>
             <a:endParaRPr lang="en-CA"/>
           </a:p>
@@ -2961,7 +2965,7 @@
           <a:p>
             <a:fld id="{6696D9AA-86B5-49C5-B021-DCFDDFB00471}" type="datetimeFigureOut">
               <a:rPr lang="en-CA" smtClean="0"/>
-              <a:t>2024-08-29</a:t>
+              <a:t>2024-09-18</a:t>
             </a:fld>
             <a:endParaRPr lang="en-CA"/>
           </a:p>
@@ -3103,7 +3107,7 @@
           <a:p>
             <a:fld id="{6696D9AA-86B5-49C5-B021-DCFDDFB00471}" type="datetimeFigureOut">
               <a:rPr lang="en-CA" smtClean="0"/>
-              <a:t>2024-08-29</a:t>
+              <a:t>2024-09-18</a:t>
             </a:fld>
             <a:endParaRPr lang="en-CA"/>
           </a:p>
@@ -3216,7 +3220,7 @@
           <a:p>
             <a:fld id="{6696D9AA-86B5-49C5-B021-DCFDDFB00471}" type="datetimeFigureOut">
               <a:rPr lang="en-CA" smtClean="0"/>
-              <a:t>2024-08-29</a:t>
+              <a:t>2024-09-18</a:t>
             </a:fld>
             <a:endParaRPr lang="en-CA"/>
           </a:p>
@@ -3529,7 +3533,7 @@
           <a:p>
             <a:fld id="{6696D9AA-86B5-49C5-B021-DCFDDFB00471}" type="datetimeFigureOut">
               <a:rPr lang="en-CA" smtClean="0"/>
-              <a:t>2024-08-29</a:t>
+              <a:t>2024-09-18</a:t>
             </a:fld>
             <a:endParaRPr lang="en-CA"/>
           </a:p>
@@ -3818,7 +3822,7 @@
           <a:p>
             <a:fld id="{6696D9AA-86B5-49C5-B021-DCFDDFB00471}" type="datetimeFigureOut">
               <a:rPr lang="en-CA" smtClean="0"/>
-              <a:t>2024-08-29</a:t>
+              <a:t>2024-09-18</a:t>
             </a:fld>
             <a:endParaRPr lang="en-CA"/>
           </a:p>
@@ -4061,7 +4065,7 @@
           <a:p>
             <a:fld id="{6696D9AA-86B5-49C5-B021-DCFDDFB00471}" type="datetimeFigureOut">
               <a:rPr lang="en-CA" smtClean="0"/>
-              <a:t>2024-08-29</a:t>
+              <a:t>2024-09-18</a:t>
             </a:fld>
             <a:endParaRPr lang="en-CA"/>
           </a:p>
@@ -4526,7 +4530,7 @@
         <p:spPr>
           <a:xfrm>
             <a:off x="1524000" y="4462943"/>
-            <a:ext cx="9144000" cy="1002191"/>
+            <a:ext cx="9144000" cy="1092569"/>
           </a:xfrm>
         </p:spPr>
         <p:txBody>
@@ -4543,7 +4547,7 @@
           <a:p>
             <a:r>
               <a:rPr lang="en-CA" dirty="0"/>
-              <a:t>Summer 2024</a:t>
+              <a:t>Summer 2024 – Mittermaier lab</a:t>
             </a:r>
           </a:p>
         </p:txBody>
@@ -4607,8 +4611,8 @@
           </a:p>
         </p:txBody>
       </p:sp>
-      <mc:AlternateContent xmlns:mc="http://schemas.openxmlformats.org/markup-compatibility/2006">
-        <mc:Choice xmlns:a14="http://schemas.microsoft.com/office/drawing/2010/main" Requires="a14">
+      <mc:AlternateContent xmlns:mc="http://schemas.openxmlformats.org/markup-compatibility/2006" xmlns:a14="http://schemas.microsoft.com/office/drawing/2010/main">
+        <mc:Choice Requires="a14">
           <p:sp>
             <p:nvSpPr>
               <p:cNvPr id="3" name="Content Placeholder 2">
@@ -5267,7 +5271,7 @@
             </p:txBody>
           </p:sp>
         </mc:Choice>
-        <mc:Fallback>
+        <mc:Fallback xmlns="">
           <p:sp>
             <p:nvSpPr>
               <p:cNvPr id="3" name="Content Placeholder 2">
@@ -5401,7 +5405,7 @@
         </p:blipFill>
         <p:spPr>
           <a:xfrm>
-            <a:off x="262128" y="463732"/>
+            <a:off x="404036" y="1066920"/>
             <a:ext cx="5533426" cy="4611188"/>
           </a:xfrm>
           <a:prstGeom prst="rect">
@@ -5445,6 +5449,187 @@
           </a:prstGeom>
         </p:spPr>
       </p:pic>
+      <p:sp>
+        <p:nvSpPr>
+          <p:cNvPr id="2" name="TextBox 1">
+            <a:extLst>
+              <a:ext uri="{FF2B5EF4-FFF2-40B4-BE49-F238E27FC236}">
+                <a16:creationId xmlns:a16="http://schemas.microsoft.com/office/drawing/2014/main" id="{B6F8CF6E-D2AA-74B9-D5BE-BFD71F0E309D}"/>
+              </a:ext>
+            </a:extLst>
+          </p:cNvPr>
+          <p:cNvSpPr txBox="1"/>
+          <p:nvPr/>
+        </p:nvSpPr>
+        <p:spPr>
+          <a:xfrm>
+            <a:off x="202018" y="160892"/>
+            <a:ext cx="3157870" cy="369332"/>
+          </a:xfrm>
+          <a:prstGeom prst="rect">
+            <a:avLst/>
+          </a:prstGeom>
+          <a:noFill/>
+        </p:spPr>
+        <p:txBody>
+          <a:bodyPr wrap="square" rtlCol="0">
+            <a:spAutoFit/>
+          </a:bodyPr>
+          <a:lstStyle/>
+          <a:p>
+            <a:r>
+              <a:rPr lang="en-CA" b="1" dirty="0"/>
+              <a:t>Kinetic fitting example:</a:t>
+            </a:r>
+          </a:p>
+        </p:txBody>
+      </p:sp>
+      <p:sp>
+        <p:nvSpPr>
+          <p:cNvPr id="6" name="TextBox 5">
+            <a:extLst>
+              <a:ext uri="{FF2B5EF4-FFF2-40B4-BE49-F238E27FC236}">
+                <a16:creationId xmlns:a16="http://schemas.microsoft.com/office/drawing/2014/main" id="{BE4CE567-F88C-F289-6328-C602DDCF54C1}"/>
+              </a:ext>
+            </a:extLst>
+          </p:cNvPr>
+          <p:cNvSpPr txBox="1"/>
+          <p:nvPr/>
+        </p:nvSpPr>
+        <p:spPr>
+          <a:xfrm>
+            <a:off x="1649373" y="882254"/>
+            <a:ext cx="3374509" cy="369332"/>
+          </a:xfrm>
+          <a:prstGeom prst="rect">
+            <a:avLst/>
+          </a:prstGeom>
+          <a:noFill/>
+        </p:spPr>
+        <p:txBody>
+          <a:bodyPr wrap="square">
+            <a:spAutoFit/>
+          </a:bodyPr>
+          <a:lstStyle/>
+          <a:p>
+            <a:pPr algn="ctr"/>
+            <a:r>
+              <a:rPr lang="en-CA" b="1" dirty="0"/>
+              <a:t>Baselines fitted to raw data</a:t>
+            </a:r>
+          </a:p>
+        </p:txBody>
+      </p:sp>
+      <p:sp>
+        <p:nvSpPr>
+          <p:cNvPr id="8" name="TextBox 7">
+            <a:extLst>
+              <a:ext uri="{FF2B5EF4-FFF2-40B4-BE49-F238E27FC236}">
+                <a16:creationId xmlns:a16="http://schemas.microsoft.com/office/drawing/2014/main" id="{0B8C08B8-A0E2-B9DC-1828-ED571B07CC7D}"/>
+              </a:ext>
+            </a:extLst>
+          </p:cNvPr>
+          <p:cNvSpPr txBox="1"/>
+          <p:nvPr/>
+        </p:nvSpPr>
+        <p:spPr>
+          <a:xfrm>
+            <a:off x="1649373" y="5375803"/>
+            <a:ext cx="3374509" cy="369332"/>
+          </a:xfrm>
+          <a:prstGeom prst="rect">
+            <a:avLst/>
+          </a:prstGeom>
+          <a:noFill/>
+        </p:spPr>
+        <p:txBody>
+          <a:bodyPr wrap="square">
+            <a:spAutoFit/>
+          </a:bodyPr>
+          <a:lstStyle/>
+          <a:p>
+            <a:pPr algn="ctr"/>
+            <a:r>
+              <a:rPr lang="en-CA" b="1" dirty="0"/>
+              <a:t>Temperature (°C)</a:t>
+            </a:r>
+          </a:p>
+        </p:txBody>
+      </p:sp>
+      <p:sp>
+        <p:nvSpPr>
+          <p:cNvPr id="9" name="TextBox 8">
+            <a:extLst>
+              <a:ext uri="{FF2B5EF4-FFF2-40B4-BE49-F238E27FC236}">
+                <a16:creationId xmlns:a16="http://schemas.microsoft.com/office/drawing/2014/main" id="{B82C5404-C04C-49A6-33C4-41CCEAE6C61D}"/>
+              </a:ext>
+            </a:extLst>
+          </p:cNvPr>
+          <p:cNvSpPr txBox="1"/>
+          <p:nvPr/>
+        </p:nvSpPr>
+        <p:spPr>
+          <a:xfrm>
+            <a:off x="7410449" y="279066"/>
+            <a:ext cx="3374509" cy="369332"/>
+          </a:xfrm>
+          <a:prstGeom prst="rect">
+            <a:avLst/>
+          </a:prstGeom>
+          <a:solidFill>
+            <a:schemeClr val="bg1"/>
+          </a:solidFill>
+        </p:spPr>
+        <p:txBody>
+          <a:bodyPr wrap="square">
+            <a:spAutoFit/>
+          </a:bodyPr>
+          <a:lstStyle/>
+          <a:p>
+            <a:pPr algn="ctr"/>
+            <a:r>
+              <a:rPr lang="en-CA" b="1" dirty="0"/>
+              <a:t>Normalized curve</a:t>
+            </a:r>
+          </a:p>
+        </p:txBody>
+      </p:sp>
+      <p:sp>
+        <p:nvSpPr>
+          <p:cNvPr id="10" name="TextBox 9">
+            <a:extLst>
+              <a:ext uri="{FF2B5EF4-FFF2-40B4-BE49-F238E27FC236}">
+                <a16:creationId xmlns:a16="http://schemas.microsoft.com/office/drawing/2014/main" id="{4260A147-C0AF-E242-1B00-90DEAF409C81}"/>
+              </a:ext>
+            </a:extLst>
+          </p:cNvPr>
+          <p:cNvSpPr txBox="1"/>
+          <p:nvPr/>
+        </p:nvSpPr>
+        <p:spPr>
+          <a:xfrm>
+            <a:off x="257164" y="2166174"/>
+            <a:ext cx="461665" cy="2184991"/>
+          </a:xfrm>
+          <a:prstGeom prst="rect">
+            <a:avLst/>
+          </a:prstGeom>
+          <a:noFill/>
+        </p:spPr>
+        <p:txBody>
+          <a:bodyPr vert="vert270" wrap="square" rtlCol="0" anchor="b" anchorCtr="0">
+            <a:spAutoFit/>
+          </a:bodyPr>
+          <a:lstStyle/>
+          <a:p>
+            <a:pPr algn="ctr"/>
+            <a:r>
+              <a:rPr lang="en-CA" b="1" dirty="0"/>
+              <a:t>Absorbance</a:t>
+            </a:r>
+          </a:p>
+        </p:txBody>
+      </p:sp>
     </p:spTree>
     <p:extLst>
       <p:ext uri="{BB962C8B-B14F-4D97-AF65-F5344CB8AC3E}">
@@ -8327,7 +8512,7 @@
           <p:nvPr>
             <p:extLst>
               <p:ext uri="{D42A27DB-BD31-4B8C-83A1-F6EECF244321}">
-                <p14:modId xmlns:p14="http://schemas.microsoft.com/office/powerpoint/2010/main" val="3889358040"/>
+                <p14:modId xmlns:p14="http://schemas.microsoft.com/office/powerpoint/2010/main" val="264150074"/>
               </p:ext>
             </p:extLst>
           </p:nvPr>
@@ -10126,7 +10311,7 @@
             <a:pPr algn="ctr"/>
             <a:r>
               <a:rPr lang="en-CA" dirty="0"/>
-              <a:t>Raw data for IDJ1</a:t>
+              <a:t>Sample: IDJ1</a:t>
             </a:r>
           </a:p>
         </p:txBody>
@@ -10337,6 +10522,41 @@
           </a:prstGeom>
         </p:spPr>
       </p:pic>
+      <p:sp>
+        <p:nvSpPr>
+          <p:cNvPr id="2" name="TextBox 1">
+            <a:extLst>
+              <a:ext uri="{FF2B5EF4-FFF2-40B4-BE49-F238E27FC236}">
+                <a16:creationId xmlns:a16="http://schemas.microsoft.com/office/drawing/2014/main" id="{F70F7BA9-8F7B-2DE3-EC3F-1AF70BE98D63}"/>
+              </a:ext>
+            </a:extLst>
+          </p:cNvPr>
+          <p:cNvSpPr txBox="1"/>
+          <p:nvPr/>
+        </p:nvSpPr>
+        <p:spPr>
+          <a:xfrm>
+            <a:off x="202018" y="160892"/>
+            <a:ext cx="2402959" cy="369332"/>
+          </a:xfrm>
+          <a:prstGeom prst="rect">
+            <a:avLst/>
+          </a:prstGeom>
+          <a:noFill/>
+        </p:spPr>
+        <p:txBody>
+          <a:bodyPr wrap="square" rtlCol="0">
+            <a:spAutoFit/>
+          </a:bodyPr>
+          <a:lstStyle/>
+          <a:p>
+            <a:r>
+              <a:rPr lang="en-CA" b="1" dirty="0"/>
+              <a:t>IDJ1 raw data – pH 5</a:t>
+            </a:r>
+          </a:p>
+        </p:txBody>
+      </p:sp>
     </p:spTree>
     <p:extLst>
       <p:ext uri="{BB962C8B-B14F-4D97-AF65-F5344CB8AC3E}">
@@ -10439,6 +10659,41 @@
           </a:prstGeom>
         </p:spPr>
       </p:pic>
+      <p:sp>
+        <p:nvSpPr>
+          <p:cNvPr id="2" name="TextBox 1">
+            <a:extLst>
+              <a:ext uri="{FF2B5EF4-FFF2-40B4-BE49-F238E27FC236}">
+                <a16:creationId xmlns:a16="http://schemas.microsoft.com/office/drawing/2014/main" id="{CBE2ED0D-6CBB-EA79-3D4B-1B4DB8080F46}"/>
+              </a:ext>
+            </a:extLst>
+          </p:cNvPr>
+          <p:cNvSpPr txBox="1"/>
+          <p:nvPr/>
+        </p:nvSpPr>
+        <p:spPr>
+          <a:xfrm>
+            <a:off x="202018" y="160892"/>
+            <a:ext cx="2402959" cy="369332"/>
+          </a:xfrm>
+          <a:prstGeom prst="rect">
+            <a:avLst/>
+          </a:prstGeom>
+          <a:noFill/>
+        </p:spPr>
+        <p:txBody>
+          <a:bodyPr wrap="square" rtlCol="0">
+            <a:spAutoFit/>
+          </a:bodyPr>
+          <a:lstStyle/>
+          <a:p>
+            <a:r>
+              <a:rPr lang="en-CA" b="1" dirty="0"/>
+              <a:t>IDJ1 raw data – pH 5.5</a:t>
+            </a:r>
+          </a:p>
+        </p:txBody>
+      </p:sp>
     </p:spTree>
     <p:extLst>
       <p:ext uri="{BB962C8B-B14F-4D97-AF65-F5344CB8AC3E}">
@@ -10541,6 +10796,41 @@
           </a:prstGeom>
         </p:spPr>
       </p:pic>
+      <p:sp>
+        <p:nvSpPr>
+          <p:cNvPr id="2" name="TextBox 1">
+            <a:extLst>
+              <a:ext uri="{FF2B5EF4-FFF2-40B4-BE49-F238E27FC236}">
+                <a16:creationId xmlns:a16="http://schemas.microsoft.com/office/drawing/2014/main" id="{B77F1E83-BA42-CA74-F3A6-EB909E12A4A4}"/>
+              </a:ext>
+            </a:extLst>
+          </p:cNvPr>
+          <p:cNvSpPr txBox="1"/>
+          <p:nvPr/>
+        </p:nvSpPr>
+        <p:spPr>
+          <a:xfrm>
+            <a:off x="202018" y="160892"/>
+            <a:ext cx="2402959" cy="369332"/>
+          </a:xfrm>
+          <a:prstGeom prst="rect">
+            <a:avLst/>
+          </a:prstGeom>
+          <a:noFill/>
+        </p:spPr>
+        <p:txBody>
+          <a:bodyPr wrap="square" rtlCol="0">
+            <a:spAutoFit/>
+          </a:bodyPr>
+          <a:lstStyle/>
+          <a:p>
+            <a:r>
+              <a:rPr lang="en-CA" b="1" dirty="0"/>
+              <a:t>IDJ1 raw data – pH 6</a:t>
+            </a:r>
+          </a:p>
+        </p:txBody>
+      </p:sp>
     </p:spTree>
     <p:extLst>
       <p:ext uri="{BB962C8B-B14F-4D97-AF65-F5344CB8AC3E}">
@@ -10643,6 +10933,41 @@
           </a:prstGeom>
         </p:spPr>
       </p:pic>
+      <p:sp>
+        <p:nvSpPr>
+          <p:cNvPr id="2" name="TextBox 1">
+            <a:extLst>
+              <a:ext uri="{FF2B5EF4-FFF2-40B4-BE49-F238E27FC236}">
+                <a16:creationId xmlns:a16="http://schemas.microsoft.com/office/drawing/2014/main" id="{F08685C7-934C-7F02-219C-1A83C1F9169F}"/>
+              </a:ext>
+            </a:extLst>
+          </p:cNvPr>
+          <p:cNvSpPr txBox="1"/>
+          <p:nvPr/>
+        </p:nvSpPr>
+        <p:spPr>
+          <a:xfrm>
+            <a:off x="202018" y="160892"/>
+            <a:ext cx="2402959" cy="369332"/>
+          </a:xfrm>
+          <a:prstGeom prst="rect">
+            <a:avLst/>
+          </a:prstGeom>
+          <a:noFill/>
+        </p:spPr>
+        <p:txBody>
+          <a:bodyPr wrap="square" rtlCol="0">
+            <a:spAutoFit/>
+          </a:bodyPr>
+          <a:lstStyle/>
+          <a:p>
+            <a:r>
+              <a:rPr lang="en-CA" b="1" dirty="0"/>
+              <a:t>IDJ1 raw data – pH 6.5</a:t>
+            </a:r>
+          </a:p>
+        </p:txBody>
+      </p:sp>
     </p:spTree>
     <p:extLst>
       <p:ext uri="{BB962C8B-B14F-4D97-AF65-F5344CB8AC3E}">
@@ -10745,6 +11070,41 @@
           </a:prstGeom>
         </p:spPr>
       </p:pic>
+      <p:sp>
+        <p:nvSpPr>
+          <p:cNvPr id="2" name="TextBox 1">
+            <a:extLst>
+              <a:ext uri="{FF2B5EF4-FFF2-40B4-BE49-F238E27FC236}">
+                <a16:creationId xmlns:a16="http://schemas.microsoft.com/office/drawing/2014/main" id="{A80EDCF1-981B-0337-A678-D896B24BEE02}"/>
+              </a:ext>
+            </a:extLst>
+          </p:cNvPr>
+          <p:cNvSpPr txBox="1"/>
+          <p:nvPr/>
+        </p:nvSpPr>
+        <p:spPr>
+          <a:xfrm>
+            <a:off x="202018" y="160892"/>
+            <a:ext cx="2402959" cy="369332"/>
+          </a:xfrm>
+          <a:prstGeom prst="rect">
+            <a:avLst/>
+          </a:prstGeom>
+          <a:noFill/>
+        </p:spPr>
+        <p:txBody>
+          <a:bodyPr wrap="square" rtlCol="0">
+            <a:spAutoFit/>
+          </a:bodyPr>
+          <a:lstStyle/>
+          <a:p>
+            <a:r>
+              <a:rPr lang="en-CA" b="1" dirty="0"/>
+              <a:t>IDJ1 raw data – pH 7</a:t>
+            </a:r>
+          </a:p>
+        </p:txBody>
+      </p:sp>
     </p:spTree>
     <p:extLst>
       <p:ext uri="{BB962C8B-B14F-4D97-AF65-F5344CB8AC3E}">
@@ -10847,6 +11207,41 @@
           </a:prstGeom>
         </p:spPr>
       </p:pic>
+      <p:sp>
+        <p:nvSpPr>
+          <p:cNvPr id="2" name="TextBox 1">
+            <a:extLst>
+              <a:ext uri="{FF2B5EF4-FFF2-40B4-BE49-F238E27FC236}">
+                <a16:creationId xmlns:a16="http://schemas.microsoft.com/office/drawing/2014/main" id="{66A6C40F-486E-8B78-9677-F0FF9705C6B5}"/>
+              </a:ext>
+            </a:extLst>
+          </p:cNvPr>
+          <p:cNvSpPr txBox="1"/>
+          <p:nvPr/>
+        </p:nvSpPr>
+        <p:spPr>
+          <a:xfrm>
+            <a:off x="202018" y="160892"/>
+            <a:ext cx="2402959" cy="369332"/>
+          </a:xfrm>
+          <a:prstGeom prst="rect">
+            <a:avLst/>
+          </a:prstGeom>
+          <a:noFill/>
+        </p:spPr>
+        <p:txBody>
+          <a:bodyPr wrap="square" rtlCol="0">
+            <a:spAutoFit/>
+          </a:bodyPr>
+          <a:lstStyle/>
+          <a:p>
+            <a:r>
+              <a:rPr lang="en-CA" b="1" dirty="0"/>
+              <a:t>IDJ1 raw data – pH 7.5</a:t>
+            </a:r>
+          </a:p>
+        </p:txBody>
+      </p:sp>
     </p:spTree>
     <p:extLst>
       <p:ext uri="{BB962C8B-B14F-4D97-AF65-F5344CB8AC3E}">
@@ -10949,6 +11344,41 @@
           </a:prstGeom>
         </p:spPr>
       </p:pic>
+      <p:sp>
+        <p:nvSpPr>
+          <p:cNvPr id="2" name="TextBox 1">
+            <a:extLst>
+              <a:ext uri="{FF2B5EF4-FFF2-40B4-BE49-F238E27FC236}">
+                <a16:creationId xmlns:a16="http://schemas.microsoft.com/office/drawing/2014/main" id="{44887C3C-9D1B-62AB-E592-D7B9ED47FCA9}"/>
+              </a:ext>
+            </a:extLst>
+          </p:cNvPr>
+          <p:cNvSpPr txBox="1"/>
+          <p:nvPr/>
+        </p:nvSpPr>
+        <p:spPr>
+          <a:xfrm>
+            <a:off x="202018" y="160892"/>
+            <a:ext cx="2402959" cy="369332"/>
+          </a:xfrm>
+          <a:prstGeom prst="rect">
+            <a:avLst/>
+          </a:prstGeom>
+          <a:noFill/>
+        </p:spPr>
+        <p:txBody>
+          <a:bodyPr wrap="square" rtlCol="0">
+            <a:spAutoFit/>
+          </a:bodyPr>
+          <a:lstStyle/>
+          <a:p>
+            <a:r>
+              <a:rPr lang="en-CA" b="1" dirty="0"/>
+              <a:t>IDJ1 raw data – pH 8</a:t>
+            </a:r>
+          </a:p>
+        </p:txBody>
+      </p:sp>
     </p:spTree>
     <p:extLst>
       <p:ext uri="{BB962C8B-B14F-4D97-AF65-F5344CB8AC3E}">

</xml_diff>